<commit_message>
Update delete person sequence diagram
</commit_message>
<xml_diff>
--- a/docs/diagrams/DeletePersonSequenceDiagram.pptx
+++ b/docs/diagrams/DeletePersonSequenceDiagram.pptx
@@ -6239,6 +6239,95 @@
           </a:p>
         </p:txBody>
       </p:sp>
+      <p:cxnSp>
+        <p:nvCxnSpPr>
+          <p:cNvPr id="61" name="Straight Connector 60">
+            <a:extLst>
+              <a:ext uri="{FF2B5EF4-FFF2-40B4-BE49-F238E27FC236}">
+                <a16:creationId xmlns:a16="http://schemas.microsoft.com/office/drawing/2014/main" id="{277CF77B-9C2B-5042-8E7A-35C0A0E5B25E}"/>
+              </a:ext>
+            </a:extLst>
+          </p:cNvPr>
+          <p:cNvCxnSpPr>
+            <a:cxnSpLocks/>
+            <a:endCxn id="120" idx="2"/>
+          </p:cNvCxnSpPr>
+          <p:nvPr/>
+        </p:nvCxnSpPr>
+        <p:spPr>
+          <a:xfrm flipV="1">
+            <a:off x="9276950" y="5772997"/>
+            <a:ext cx="0" cy="1085004"/>
+          </a:xfrm>
+          <a:prstGeom prst="line">
+            <a:avLst/>
+          </a:prstGeom>
+          <a:ln w="19050">
+            <a:solidFill>
+              <a:srgbClr val="C00000"/>
+            </a:solidFill>
+            <a:prstDash val="dash"/>
+          </a:ln>
+        </p:spPr>
+        <p:style>
+          <a:lnRef idx="1">
+            <a:schemeClr val="accent1"/>
+          </a:lnRef>
+          <a:fillRef idx="0">
+            <a:schemeClr val="accent1"/>
+          </a:fillRef>
+          <a:effectRef idx="0">
+            <a:schemeClr val="accent1"/>
+          </a:effectRef>
+          <a:fontRef idx="minor">
+            <a:schemeClr val="tx1"/>
+          </a:fontRef>
+        </p:style>
+      </p:cxnSp>
+      <p:cxnSp>
+        <p:nvCxnSpPr>
+          <p:cNvPr id="66" name="Straight Connector 65">
+            <a:extLst>
+              <a:ext uri="{FF2B5EF4-FFF2-40B4-BE49-F238E27FC236}">
+                <a16:creationId xmlns:a16="http://schemas.microsoft.com/office/drawing/2014/main" id="{EB4D1402-5C03-5F42-B228-983D306C55D0}"/>
+              </a:ext>
+            </a:extLst>
+          </p:cNvPr>
+          <p:cNvCxnSpPr>
+            <a:cxnSpLocks/>
+          </p:cNvCxnSpPr>
+          <p:nvPr/>
+        </p:nvCxnSpPr>
+        <p:spPr>
+          <a:xfrm flipV="1">
+            <a:off x="10624900" y="5579458"/>
+            <a:ext cx="0" cy="1278542"/>
+          </a:xfrm>
+          <a:prstGeom prst="line">
+            <a:avLst/>
+          </a:prstGeom>
+          <a:ln w="19050">
+            <a:solidFill>
+              <a:srgbClr val="C00000"/>
+            </a:solidFill>
+            <a:prstDash val="dash"/>
+          </a:ln>
+        </p:spPr>
+        <p:style>
+          <a:lnRef idx="1">
+            <a:schemeClr val="accent1"/>
+          </a:lnRef>
+          <a:fillRef idx="0">
+            <a:schemeClr val="accent1"/>
+          </a:fillRef>
+          <a:effectRef idx="0">
+            <a:schemeClr val="accent1"/>
+          </a:effectRef>
+          <a:fontRef idx="minor">
+            <a:schemeClr val="tx1"/>
+          </a:fontRef>
+        </p:style>
+      </p:cxnSp>
     </p:spTree>
     <p:extLst>
       <p:ext uri="{BB962C8B-B14F-4D97-AF65-F5344CB8AC3E}">

</xml_diff>